<commit_message>
LAYOUT CORRECTION capm 10
</commit_message>
<xml_diff>
--- a/CAPM-DAY-10/CAPM-10.pptx
+++ b/CAPM-DAY-10/CAPM-10.pptx
@@ -883,7 +883,7 @@
           <a:p>
             <a:fld id="{A5CD54AC-F298-4D3B-8C69-71800F15EAC3}" type="datetimeFigureOut">
               <a:rPr lang="en-US" smtClean="0"/>
-              <a:t>5/9/2024</a:t>
+              <a:t>5/10/2024</a:t>
             </a:fld>
             <a:endParaRPr lang="en-US"/>
           </a:p>
@@ -1381,7 +1381,7 @@
           <a:p>
             <a:fld id="{2C3B68F5-01BD-44AE-A4B2-9F4661C723B8}" type="datetimeFigureOut">
               <a:rPr lang="en-US" smtClean="0"/>
-              <a:t>5/9/2024</a:t>
+              <a:t>5/10/2024</a:t>
             </a:fld>
             <a:endParaRPr lang="en-US"/>
           </a:p>
@@ -1579,7 +1579,7 @@
           <a:p>
             <a:fld id="{2C3B68F5-01BD-44AE-A4B2-9F4661C723B8}" type="datetimeFigureOut">
               <a:rPr lang="en-US" smtClean="0"/>
-              <a:t>5/9/2024</a:t>
+              <a:t>5/10/2024</a:t>
             </a:fld>
             <a:endParaRPr lang="en-US"/>
           </a:p>
@@ -1787,7 +1787,7 @@
           <a:p>
             <a:fld id="{2C3B68F5-01BD-44AE-A4B2-9F4661C723B8}" type="datetimeFigureOut">
               <a:rPr lang="en-US" smtClean="0"/>
-              <a:t>5/9/2024</a:t>
+              <a:t>5/10/2024</a:t>
             </a:fld>
             <a:endParaRPr lang="en-US"/>
           </a:p>
@@ -1985,7 +1985,7 @@
           <a:p>
             <a:fld id="{2C3B68F5-01BD-44AE-A4B2-9F4661C723B8}" type="datetimeFigureOut">
               <a:rPr lang="en-US" smtClean="0"/>
-              <a:t>5/9/2024</a:t>
+              <a:t>5/10/2024</a:t>
             </a:fld>
             <a:endParaRPr lang="en-US"/>
           </a:p>
@@ -2260,7 +2260,7 @@
           <a:p>
             <a:fld id="{2C3B68F5-01BD-44AE-A4B2-9F4661C723B8}" type="datetimeFigureOut">
               <a:rPr lang="en-US" smtClean="0"/>
-              <a:t>5/9/2024</a:t>
+              <a:t>5/10/2024</a:t>
             </a:fld>
             <a:endParaRPr lang="en-US"/>
           </a:p>
@@ -2525,7 +2525,7 @@
           <a:p>
             <a:fld id="{2C3B68F5-01BD-44AE-A4B2-9F4661C723B8}" type="datetimeFigureOut">
               <a:rPr lang="en-US" smtClean="0"/>
-              <a:t>5/9/2024</a:t>
+              <a:t>5/10/2024</a:t>
             </a:fld>
             <a:endParaRPr lang="en-US"/>
           </a:p>
@@ -2937,7 +2937,7 @@
           <a:p>
             <a:fld id="{2C3B68F5-01BD-44AE-A4B2-9F4661C723B8}" type="datetimeFigureOut">
               <a:rPr lang="en-US" smtClean="0"/>
-              <a:t>5/9/2024</a:t>
+              <a:t>5/10/2024</a:t>
             </a:fld>
             <a:endParaRPr lang="en-US"/>
           </a:p>
@@ -3078,7 +3078,7 @@
           <a:p>
             <a:fld id="{2C3B68F5-01BD-44AE-A4B2-9F4661C723B8}" type="datetimeFigureOut">
               <a:rPr lang="en-US" smtClean="0"/>
-              <a:t>5/9/2024</a:t>
+              <a:t>5/10/2024</a:t>
             </a:fld>
             <a:endParaRPr lang="en-US"/>
           </a:p>
@@ -3191,7 +3191,7 @@
           <a:p>
             <a:fld id="{2C3B68F5-01BD-44AE-A4B2-9F4661C723B8}" type="datetimeFigureOut">
               <a:rPr lang="en-US" smtClean="0"/>
-              <a:t>5/9/2024</a:t>
+              <a:t>5/10/2024</a:t>
             </a:fld>
             <a:endParaRPr lang="en-US"/>
           </a:p>
@@ -3502,7 +3502,7 @@
           <a:p>
             <a:fld id="{2C3B68F5-01BD-44AE-A4B2-9F4661C723B8}" type="datetimeFigureOut">
               <a:rPr lang="en-US" smtClean="0"/>
-              <a:t>5/9/2024</a:t>
+              <a:t>5/10/2024</a:t>
             </a:fld>
             <a:endParaRPr lang="en-US"/>
           </a:p>
@@ -3790,7 +3790,7 @@
           <a:p>
             <a:fld id="{2C3B68F5-01BD-44AE-A4B2-9F4661C723B8}" type="datetimeFigureOut">
               <a:rPr lang="en-US" smtClean="0"/>
-              <a:t>5/9/2024</a:t>
+              <a:t>5/10/2024</a:t>
             </a:fld>
             <a:endParaRPr lang="en-US"/>
           </a:p>
@@ -4031,7 +4031,7 @@
           <a:p>
             <a:fld id="{2C3B68F5-01BD-44AE-A4B2-9F4661C723B8}" type="datetimeFigureOut">
               <a:rPr lang="en-US" smtClean="0"/>
-              <a:t>5/9/2024</a:t>
+              <a:t>5/10/2024</a:t>
             </a:fld>
             <a:endParaRPr lang="en-US"/>
           </a:p>
@@ -7290,7 +7290,7 @@
         </p:nvSpPr>
         <p:spPr>
           <a:xfrm>
-            <a:off x="627126" y="2119123"/>
+            <a:off x="608838" y="2466596"/>
             <a:ext cx="3307164" cy="512064"/>
           </a:xfrm>
           <a:prstGeom prst="roundRect">
@@ -7436,7 +7436,7 @@
         </p:nvGrpSpPr>
         <p:grpSpPr>
           <a:xfrm>
-            <a:off x="627126" y="2688335"/>
+            <a:off x="608838" y="3035808"/>
             <a:ext cx="4101846" cy="786384"/>
             <a:chOff x="1069848" y="2807207"/>
             <a:chExt cx="4672584" cy="786384"/>
@@ -7696,8 +7696,8 @@
         </p:nvCxnSpPr>
         <p:spPr>
           <a:xfrm>
-            <a:off x="4728972" y="3081528"/>
-            <a:ext cx="1450848" cy="512063"/>
+            <a:off x="4710684" y="3429001"/>
+            <a:ext cx="1469136" cy="164590"/>
           </a:xfrm>
           <a:prstGeom prst="bentConnector3">
             <a:avLst/>
@@ -7871,6 +7871,116 @@
                 <a:srgbClr val="FF0000"/>
               </a:solidFill>
             </a:endParaRPr>
+          </a:p>
+        </p:txBody>
+      </p:sp>
+      <p:sp>
+        <p:nvSpPr>
+          <p:cNvPr id="3" name="Rectangle: Single Corner Snipped 2">
+            <a:extLst>
+              <a:ext uri="{FF2B5EF4-FFF2-40B4-BE49-F238E27FC236}">
+                <a16:creationId xmlns:a16="http://schemas.microsoft.com/office/drawing/2014/main" id="{EB2EE3EA-8AF6-98F2-7DA3-0CBE6C4828D1}"/>
+              </a:ext>
+            </a:extLst>
+          </p:cNvPr>
+          <p:cNvSpPr/>
+          <p:nvPr/>
+        </p:nvSpPr>
+        <p:spPr>
+          <a:xfrm>
+            <a:off x="1280160" y="1874520"/>
+            <a:ext cx="1892804" cy="512064"/>
+          </a:xfrm>
+          <a:prstGeom prst="snip1Rect">
+            <a:avLst/>
+          </a:prstGeom>
+          <a:solidFill>
+            <a:schemeClr val="accent4">
+              <a:lumMod val="40000"/>
+              <a:lumOff val="60000"/>
+            </a:schemeClr>
+          </a:solidFill>
+        </p:spPr>
+        <p:style>
+          <a:lnRef idx="3">
+            <a:schemeClr val="lt1"/>
+          </a:lnRef>
+          <a:fillRef idx="1">
+            <a:schemeClr val="accent4"/>
+          </a:fillRef>
+          <a:effectRef idx="1">
+            <a:schemeClr val="accent4"/>
+          </a:effectRef>
+          <a:fontRef idx="minor">
+            <a:schemeClr val="lt1"/>
+          </a:fontRef>
+        </p:style>
+        <p:txBody>
+          <a:bodyPr rtlCol="0" anchor="ctr"/>
+          <a:lstStyle/>
+          <a:p>
+            <a:pPr algn="ctr"/>
+            <a:r>
+              <a:rPr lang="en-IN" dirty="0">
+                <a:solidFill>
+                  <a:schemeClr val="tx1"/>
+                </a:solidFill>
+              </a:rPr>
+              <a:t>Fiori</a:t>
+            </a:r>
+            <a:r>
+              <a:rPr lang="en-IN" dirty="0"/>
+              <a:t> </a:t>
+            </a:r>
+            <a:r>
+              <a:rPr lang="en-IN" dirty="0">
+                <a:solidFill>
+                  <a:schemeClr val="tx1"/>
+                </a:solidFill>
+              </a:rPr>
+              <a:t>App</a:t>
+            </a:r>
+            <a:endParaRPr lang="en-US" dirty="0">
+              <a:solidFill>
+                <a:schemeClr val="tx1"/>
+              </a:solidFill>
+            </a:endParaRPr>
+          </a:p>
+        </p:txBody>
+      </p:sp>
+      <p:sp>
+        <p:nvSpPr>
+          <p:cNvPr id="9" name="TextBox 8">
+            <a:extLst>
+              <a:ext uri="{FF2B5EF4-FFF2-40B4-BE49-F238E27FC236}">
+                <a16:creationId xmlns:a16="http://schemas.microsoft.com/office/drawing/2014/main" id="{30E9406F-1150-90CE-7C20-1873E6094B25}"/>
+              </a:ext>
+            </a:extLst>
+          </p:cNvPr>
+          <p:cNvSpPr txBox="1"/>
+          <p:nvPr/>
+        </p:nvSpPr>
+        <p:spPr>
+          <a:xfrm>
+            <a:off x="8731755" y="2549649"/>
+            <a:ext cx="2588511" cy="338554"/>
+          </a:xfrm>
+          <a:prstGeom prst="rect">
+            <a:avLst/>
+          </a:prstGeom>
+          <a:noFill/>
+        </p:spPr>
+        <p:txBody>
+          <a:bodyPr wrap="square" rtlCol="0">
+            <a:spAutoFit/>
+          </a:bodyPr>
+          <a:lstStyle/>
+          <a:p>
+            <a:r>
+              <a:rPr lang="en-IN" sz="1600" b="1" dirty="0"/>
+              <a:t>ZSEPMRA_PROD_MAN</a:t>
+            </a:r>
+            <a:endParaRPr lang="en-US" sz="1600" b="1" dirty="0"/>
           </a:p>
         </p:txBody>
       </p:sp>

</xml_diff>